<commit_message>
minor changes in approach presentation
</commit_message>
<xml_diff>
--- a/LoanDelinquencyPrediction/Approach_Loan_Delinquency.pptx
+++ b/LoanDelinquencyPrediction/Approach_Loan_Delinquency.pptx
@@ -291,7 +291,7 @@
             <a:fld id="{87DE6118-2437-4B30-8E3C-4D2BE6020583}" type="datetimeFigureOut">
               <a:rPr lang="en-US" dirty="0"/>
               <a:pPr/>
-              <a:t>8/28/19</a:t>
+              <a:t>10/26/19</a:t>
             </a:fld>
             <a:endParaRPr lang="en-US" dirty="0"/>
           </a:p>
@@ -617,7 +617,7 @@
           <a:p>
             <a:fld id="{87DE6118-2437-4B30-8E3C-4D2BE6020583}" type="datetimeFigureOut">
               <a:rPr lang="en-US" dirty="0"/>
-              <a:t>8/28/19</a:t>
+              <a:t>10/26/19</a:t>
             </a:fld>
             <a:endParaRPr lang="en-US" dirty="0"/>
           </a:p>
@@ -792,7 +792,7 @@
           <a:p>
             <a:fld id="{87DE6118-2437-4B30-8E3C-4D2BE6020583}" type="datetimeFigureOut">
               <a:rPr lang="en-US" dirty="0"/>
-              <a:t>8/28/19</a:t>
+              <a:t>10/26/19</a:t>
             </a:fld>
             <a:endParaRPr lang="en-US" dirty="0"/>
           </a:p>
@@ -957,7 +957,7 @@
           <a:p>
             <a:fld id="{87DE6118-2437-4B30-8E3C-4D2BE6020583}" type="datetimeFigureOut">
               <a:rPr lang="en-US" dirty="0"/>
-              <a:t>8/28/19</a:t>
+              <a:t>10/26/19</a:t>
             </a:fld>
             <a:endParaRPr lang="en-US" dirty="0"/>
           </a:p>
@@ -1230,7 +1230,7 @@
             <a:fld id="{87DE6118-2437-4B30-8E3C-4D2BE6020583}" type="datetimeFigureOut">
               <a:rPr lang="en-US" dirty="0"/>
               <a:pPr/>
-              <a:t>8/28/19</a:t>
+              <a:t>10/26/19</a:t>
             </a:fld>
             <a:endParaRPr lang="en-US" dirty="0"/>
           </a:p>
@@ -1620,7 +1620,7 @@
           <a:p>
             <a:fld id="{87DE6118-2437-4B30-8E3C-4D2BE6020583}" type="datetimeFigureOut">
               <a:rPr lang="en-US" dirty="0"/>
-              <a:t>8/28/19</a:t>
+              <a:t>10/26/19</a:t>
             </a:fld>
             <a:endParaRPr lang="en-US" dirty="0"/>
           </a:p>
@@ -2092,7 +2092,7 @@
           <a:p>
             <a:fld id="{87DE6118-2437-4B30-8E3C-4D2BE6020583}" type="datetimeFigureOut">
               <a:rPr lang="en-US" dirty="0"/>
-              <a:t>8/28/19</a:t>
+              <a:t>10/26/19</a:t>
             </a:fld>
             <a:endParaRPr lang="en-US" dirty="0"/>
           </a:p>
@@ -2205,7 +2205,7 @@
           <a:p>
             <a:fld id="{87DE6118-2437-4B30-8E3C-4D2BE6020583}" type="datetimeFigureOut">
               <a:rPr lang="en-US" dirty="0"/>
-              <a:t>8/28/19</a:t>
+              <a:t>10/26/19</a:t>
             </a:fld>
             <a:endParaRPr lang="en-US" dirty="0"/>
           </a:p>
@@ -2295,7 +2295,7 @@
           <a:p>
             <a:fld id="{87DE6118-2437-4B30-8E3C-4D2BE6020583}" type="datetimeFigureOut">
               <a:rPr lang="en-US" dirty="0"/>
-              <a:t>8/28/19</a:t>
+              <a:t>10/26/19</a:t>
             </a:fld>
             <a:endParaRPr lang="en-US" dirty="0"/>
           </a:p>
@@ -2637,7 +2637,7 @@
             <a:fld id="{87DE6118-2437-4B30-8E3C-4D2BE6020583}" type="datetimeFigureOut">
               <a:rPr lang="en-US" dirty="0"/>
               <a:pPr/>
-              <a:t>8/28/19</a:t>
+              <a:t>10/26/19</a:t>
             </a:fld>
             <a:endParaRPr lang="en-US" dirty="0"/>
           </a:p>
@@ -3022,7 +3022,7 @@
             <a:fld id="{87DE6118-2437-4B30-8E3C-4D2BE6020583}" type="datetimeFigureOut">
               <a:rPr lang="en-US" dirty="0"/>
               <a:pPr/>
-              <a:t>8/28/19</a:t>
+              <a:t>10/26/19</a:t>
             </a:fld>
             <a:endParaRPr lang="en-US" dirty="0"/>
           </a:p>
@@ -3297,7 +3297,7 @@
             <a:fld id="{87DE6118-2437-4B30-8E3C-4D2BE6020583}" type="datetimeFigureOut">
               <a:rPr lang="en-US" dirty="0"/>
               <a:pPr/>
-              <a:t>8/28/19</a:t>
+              <a:t>10/26/19</a:t>
             </a:fld>
             <a:endParaRPr lang="en-US" dirty="0"/>
           </a:p>
@@ -3855,12 +3855,6 @@
           <a:lstStyle/>
           <a:p>
             <a:r>
-              <a:rPr lang="en-IN" dirty="0"/>
-              <a:t>India ML Hiring Hackathon 2019</a:t>
-            </a:r>
-          </a:p>
-          <a:p>
-            <a:r>
               <a:rPr lang="en-US" dirty="0">
                 <a:solidFill>
                   <a:schemeClr val="accent5">
@@ -4859,7 +4853,7 @@
           <a:p>
             <a:r>
               <a:rPr lang="en-US" sz="3000" dirty="0"/>
-              <a:t>5 things a participant must focus on while solving such problems?</a:t>
+              <a:t>5 things to focus on while solving such problems?</a:t>
             </a:r>
           </a:p>
         </p:txBody>

</xml_diff>